<commit_message>
fin subsystem schematic, lab meeting pres, si, thermo review, image segmentation, stats readings, STAX
</commit_message>
<xml_diff>
--- a/IDEAlab/Presentations/Jacob Update IX.pptx
+++ b/IDEAlab/Presentations/Jacob Update IX.pptx
@@ -203,7 +203,7 @@
           <a:p>
             <a:fld id="{2ED7F260-2CD9-45F9-AE57-C10EE5666276}" type="datetimeFigureOut">
               <a:rPr lang="en-US" smtClean="0"/>
-              <a:t>11/3/2017</a:t>
+              <a:t>2/9/2018</a:t>
             </a:fld>
             <a:endParaRPr lang="en-US"/>
           </a:p>
@@ -601,7 +601,7 @@
           <a:p>
             <a:fld id="{CFC36377-5E45-413A-82FF-B7E6E5303FD2}" type="datetimeFigureOut">
               <a:rPr lang="en-US" smtClean="0"/>
-              <a:t>11/3/2017</a:t>
+              <a:t>2/9/2018</a:t>
             </a:fld>
             <a:endParaRPr lang="en-US"/>
           </a:p>
@@ -776,7 +776,7 @@
           <a:p>
             <a:fld id="{CFC36377-5E45-413A-82FF-B7E6E5303FD2}" type="datetimeFigureOut">
               <a:rPr lang="en-US" smtClean="0"/>
-              <a:t>11/3/2017</a:t>
+              <a:t>2/9/2018</a:t>
             </a:fld>
             <a:endParaRPr lang="en-US"/>
           </a:p>
@@ -956,7 +956,7 @@
           <a:p>
             <a:fld id="{CFC36377-5E45-413A-82FF-B7E6E5303FD2}" type="datetimeFigureOut">
               <a:rPr lang="en-US" smtClean="0"/>
-              <a:t>11/3/2017</a:t>
+              <a:t>2/9/2018</a:t>
             </a:fld>
             <a:endParaRPr lang="en-US"/>
           </a:p>
@@ -1131,7 +1131,7 @@
           <a:p>
             <a:fld id="{CFC36377-5E45-413A-82FF-B7E6E5303FD2}" type="datetimeFigureOut">
               <a:rPr lang="en-US" smtClean="0"/>
-              <a:t>11/3/2017</a:t>
+              <a:t>2/9/2018</a:t>
             </a:fld>
             <a:endParaRPr lang="en-US"/>
           </a:p>
@@ -1377,7 +1377,7 @@
           <a:p>
             <a:fld id="{CFC36377-5E45-413A-82FF-B7E6E5303FD2}" type="datetimeFigureOut">
               <a:rPr lang="en-US" smtClean="0"/>
-              <a:t>11/3/2017</a:t>
+              <a:t>2/9/2018</a:t>
             </a:fld>
             <a:endParaRPr lang="en-US"/>
           </a:p>
@@ -1614,7 +1614,7 @@
           <a:p>
             <a:fld id="{CFC36377-5E45-413A-82FF-B7E6E5303FD2}" type="datetimeFigureOut">
               <a:rPr lang="en-US" smtClean="0"/>
-              <a:t>11/3/2017</a:t>
+              <a:t>2/9/2018</a:t>
             </a:fld>
             <a:endParaRPr lang="en-US"/>
           </a:p>
@@ -1981,7 +1981,7 @@
           <a:p>
             <a:fld id="{CFC36377-5E45-413A-82FF-B7E6E5303FD2}" type="datetimeFigureOut">
               <a:rPr lang="en-US" smtClean="0"/>
-              <a:t>11/3/2017</a:t>
+              <a:t>2/9/2018</a:t>
             </a:fld>
             <a:endParaRPr lang="en-US"/>
           </a:p>
@@ -2099,7 +2099,7 @@
           <a:p>
             <a:fld id="{CFC36377-5E45-413A-82FF-B7E6E5303FD2}" type="datetimeFigureOut">
               <a:rPr lang="en-US" smtClean="0"/>
-              <a:t>11/3/2017</a:t>
+              <a:t>2/9/2018</a:t>
             </a:fld>
             <a:endParaRPr lang="en-US"/>
           </a:p>
@@ -2194,7 +2194,7 @@
           <a:p>
             <a:fld id="{CFC36377-5E45-413A-82FF-B7E6E5303FD2}" type="datetimeFigureOut">
               <a:rPr lang="en-US" smtClean="0"/>
-              <a:t>11/3/2017</a:t>
+              <a:t>2/9/2018</a:t>
             </a:fld>
             <a:endParaRPr lang="en-US"/>
           </a:p>
@@ -2471,7 +2471,7 @@
           <a:p>
             <a:fld id="{CFC36377-5E45-413A-82FF-B7E6E5303FD2}" type="datetimeFigureOut">
               <a:rPr lang="en-US" smtClean="0"/>
-              <a:t>11/3/2017</a:t>
+              <a:t>2/9/2018</a:t>
             </a:fld>
             <a:endParaRPr lang="en-US"/>
           </a:p>
@@ -2728,7 +2728,7 @@
           <a:p>
             <a:fld id="{CFC36377-5E45-413A-82FF-B7E6E5303FD2}" type="datetimeFigureOut">
               <a:rPr lang="en-US" smtClean="0"/>
-              <a:t>11/3/2017</a:t>
+              <a:t>2/9/2018</a:t>
             </a:fld>
             <a:endParaRPr lang="en-US"/>
           </a:p>
@@ -2941,7 +2941,7 @@
           <a:p>
             <a:fld id="{CFC36377-5E45-413A-82FF-B7E6E5303FD2}" type="datetimeFigureOut">
               <a:rPr lang="en-US" smtClean="0"/>
-              <a:t>11/3/2017</a:t>
+              <a:t>2/9/2018</a:t>
             </a:fld>
             <a:endParaRPr lang="en-US"/>
           </a:p>
@@ -3368,7 +3368,7 @@
           <a:p>
             <a:r>
               <a:rPr lang="en-US" dirty="0"/>
-              <a:t>Hopping Robot Update VIII</a:t>
+              <a:t>Hopping Robot Update X</a:t>
             </a:r>
           </a:p>
         </p:txBody>
@@ -3392,7 +3392,7 @@
           <a:p>
             <a:r>
               <a:rPr lang="en-US" sz="3600" dirty="0"/>
-              <a:t>Experiment</a:t>
+              <a:t>Results</a:t>
             </a:r>
           </a:p>
         </p:txBody>
@@ -3473,7 +3473,9 @@
         </p:nvSpPr>
         <p:spPr/>
         <p:txBody>
-          <a:bodyPr/>
+          <a:bodyPr>
+            <a:normAutofit/>
+          </a:bodyPr>
           <a:lstStyle/>
           <a:p>
             <a:pPr marL="0" indent="0">
@@ -3481,48 +3483,85 @@
             </a:pPr>
             <a:r>
               <a:rPr lang="en-US" sz="3200" i="1" dirty="0"/>
-              <a:t>Validate/improve simulation with experiments</a:t>
+              <a:t>Present results, complete full </a:t>
+            </a:r>
+            <a:r>
+              <a:rPr lang="en-US" sz="3200" i="1" dirty="0" err="1"/>
+              <a:t>Pynamics</a:t>
+            </a:r>
+            <a:r>
+              <a:rPr lang="en-US" sz="3200" i="1" dirty="0"/>
+              <a:t> model</a:t>
             </a:r>
           </a:p>
           <a:p>
             <a:r>
               <a:rPr lang="en-US" sz="3200" dirty="0"/>
-              <a:t>Conduct experiments on multiple legs to capture:</a:t>
+              <a:t>TODO</a:t>
             </a:r>
           </a:p>
           <a:p>
             <a:pPr lvl="1"/>
             <a:r>
-              <a:rPr lang="en-US" sz="2800" dirty="0"/>
-              <a:t>Forces (load cell)</a:t>
+              <a:rPr lang="en-US" dirty="0"/>
+              <a:t>finish collecting motor constants</a:t>
             </a:r>
           </a:p>
           <a:p>
             <a:pPr lvl="1"/>
             <a:r>
-              <a:rPr lang="en-US" sz="2800" dirty="0"/>
-              <a:t>Jump height (cameras)</a:t>
+              <a:rPr lang="en-US" dirty="0"/>
+              <a:t>maybe verify motor</a:t>
             </a:r>
           </a:p>
           <a:p>
             <a:pPr lvl="1"/>
             <a:r>
-              <a:rPr lang="en-US" sz="2800" dirty="0"/>
-              <a:t>Power consumption (V/I sensor)</a:t>
+              <a:rPr lang="en-US" dirty="0"/>
+              <a:t>verify final </a:t>
+            </a:r>
+            <a:r>
+              <a:rPr lang="en-US" dirty="0" err="1"/>
+              <a:t>pynamics</a:t>
+            </a:r>
+            <a:r>
+              <a:rPr lang="en-US" dirty="0"/>
+              <a:t> sim</a:t>
             </a:r>
           </a:p>
           <a:p>
             <a:pPr lvl="1"/>
             <a:r>
-              <a:rPr lang="en-US" sz="2800" dirty="0"/>
-              <a:t>Angular Position (encoder)</a:t>
-            </a:r>
-          </a:p>
-          <a:p>
-            <a:r>
-              <a:rPr lang="en-US" sz="3200" dirty="0"/>
-              <a:t>And improve simulation</a:t>
-            </a:r>
+              <a:rPr lang="en-US" dirty="0"/>
+              <a:t>run final </a:t>
+            </a:r>
+            <a:r>
+              <a:rPr lang="en-US" dirty="0" err="1"/>
+              <a:t>pynamics</a:t>
+            </a:r>
+            <a:r>
+              <a:rPr lang="en-US" dirty="0"/>
+              <a:t> sim for all designs</a:t>
+            </a:r>
+          </a:p>
+          <a:p>
+            <a:pPr lvl="1"/>
+            <a:r>
+              <a:rPr lang="en-US" dirty="0"/>
+              <a:t>labeled diagram of system</a:t>
+            </a:r>
+          </a:p>
+          <a:p>
+            <a:pPr lvl="1"/>
+            <a:r>
+              <a:rPr lang="en-US" dirty="0"/>
+              <a:t>frame by frame of </a:t>
+            </a:r>
+            <a:r>
+              <a:rPr lang="en-US"/>
+              <a:t>one design</a:t>
+            </a:r>
+            <a:endParaRPr lang="en-US" dirty="0"/>
           </a:p>
         </p:txBody>
       </p:sp>

</xml_diff>